<commit_message>
Created a seperate LoopController class to handle looping and throttling. Moved all Gui.DrawImage(*...) calls over to useing a Texture instance ( VCGLTexture handle ).
</commit_message>
<xml_diff>
--- a/Docs/Rendering Loop.pptx
+++ b/Docs/Rendering Loop.pptx
@@ -5,8 +5,9 @@
     <p:sldMasterId id="2147483648" r:id="rId1"/>
   </p:sldMasterIdLst>
   <p:sldIdLst>
-    <p:sldId id="256" r:id="rId2"/>
-    <p:sldId id="257" r:id="rId3"/>
+    <p:sldId id="258" r:id="rId2"/>
+    <p:sldId id="256" r:id="rId3"/>
+    <p:sldId id="257" r:id="rId4"/>
   </p:sldIdLst>
   <p:sldSz cx="12192000" cy="6858000"/>
   <p:notesSz cx="6858000" cy="9144000"/>
@@ -105,6 +106,11 @@
       </a:defRPr>
     </a:lvl9pPr>
   </p:defaultTextStyle>
+  <p:extLst>
+    <p:ext uri="{EFAFB233-063F-42B5-8137-9DF3F51BA10A}">
+      <p15:sldGuideLst xmlns:p15="http://schemas.microsoft.com/office/powerpoint/2012/main"/>
+    </p:ext>
+  </p:extLst>
 </p:presentation>
 </file>
 
@@ -239,7 +245,7 @@
           <a:p>
             <a:fld id="{E1CB8188-18CC-4270-A14A-394BBC8B3A55}" type="datetimeFigureOut">
               <a:rPr lang="en-US" smtClean="0"/>
-              <a:t>3/19/2014</a:t>
+              <a:t>3/21/2014</a:t>
             </a:fld>
             <a:endParaRPr lang="en-US"/>
           </a:p>
@@ -409,7 +415,7 @@
           <a:p>
             <a:fld id="{E1CB8188-18CC-4270-A14A-394BBC8B3A55}" type="datetimeFigureOut">
               <a:rPr lang="en-US" smtClean="0"/>
-              <a:t>3/19/2014</a:t>
+              <a:t>3/21/2014</a:t>
             </a:fld>
             <a:endParaRPr lang="en-US"/>
           </a:p>
@@ -589,7 +595,7 @@
           <a:p>
             <a:fld id="{E1CB8188-18CC-4270-A14A-394BBC8B3A55}" type="datetimeFigureOut">
               <a:rPr lang="en-US" smtClean="0"/>
-              <a:t>3/19/2014</a:t>
+              <a:t>3/21/2014</a:t>
             </a:fld>
             <a:endParaRPr lang="en-US"/>
           </a:p>
@@ -759,7 +765,7 @@
           <a:p>
             <a:fld id="{E1CB8188-18CC-4270-A14A-394BBC8B3A55}" type="datetimeFigureOut">
               <a:rPr lang="en-US" smtClean="0"/>
-              <a:t>3/19/2014</a:t>
+              <a:t>3/21/2014</a:t>
             </a:fld>
             <a:endParaRPr lang="en-US"/>
           </a:p>
@@ -1005,7 +1011,7 @@
           <a:p>
             <a:fld id="{E1CB8188-18CC-4270-A14A-394BBC8B3A55}" type="datetimeFigureOut">
               <a:rPr lang="en-US" smtClean="0"/>
-              <a:t>3/19/2014</a:t>
+              <a:t>3/21/2014</a:t>
             </a:fld>
             <a:endParaRPr lang="en-US"/>
           </a:p>
@@ -1237,7 +1243,7 @@
           <a:p>
             <a:fld id="{E1CB8188-18CC-4270-A14A-394BBC8B3A55}" type="datetimeFigureOut">
               <a:rPr lang="en-US" smtClean="0"/>
-              <a:t>3/19/2014</a:t>
+              <a:t>3/21/2014</a:t>
             </a:fld>
             <a:endParaRPr lang="en-US"/>
           </a:p>
@@ -1604,7 +1610,7 @@
           <a:p>
             <a:fld id="{E1CB8188-18CC-4270-A14A-394BBC8B3A55}" type="datetimeFigureOut">
               <a:rPr lang="en-US" smtClean="0"/>
-              <a:t>3/19/2014</a:t>
+              <a:t>3/21/2014</a:t>
             </a:fld>
             <a:endParaRPr lang="en-US"/>
           </a:p>
@@ -1722,7 +1728,7 @@
           <a:p>
             <a:fld id="{E1CB8188-18CC-4270-A14A-394BBC8B3A55}" type="datetimeFigureOut">
               <a:rPr lang="en-US" smtClean="0"/>
-              <a:t>3/19/2014</a:t>
+              <a:t>3/21/2014</a:t>
             </a:fld>
             <a:endParaRPr lang="en-US"/>
           </a:p>
@@ -1817,7 +1823,7 @@
           <a:p>
             <a:fld id="{E1CB8188-18CC-4270-A14A-394BBC8B3A55}" type="datetimeFigureOut">
               <a:rPr lang="en-US" smtClean="0"/>
-              <a:t>3/19/2014</a:t>
+              <a:t>3/21/2014</a:t>
             </a:fld>
             <a:endParaRPr lang="en-US"/>
           </a:p>
@@ -2094,7 +2100,7 @@
           <a:p>
             <a:fld id="{E1CB8188-18CC-4270-A14A-394BBC8B3A55}" type="datetimeFigureOut">
               <a:rPr lang="en-US" smtClean="0"/>
-              <a:t>3/19/2014</a:t>
+              <a:t>3/21/2014</a:t>
             </a:fld>
             <a:endParaRPr lang="en-US"/>
           </a:p>
@@ -2347,7 +2353,7 @@
           <a:p>
             <a:fld id="{E1CB8188-18CC-4270-A14A-394BBC8B3A55}" type="datetimeFigureOut">
               <a:rPr lang="en-US" smtClean="0"/>
-              <a:t>3/19/2014</a:t>
+              <a:t>3/21/2014</a:t>
             </a:fld>
             <a:endParaRPr lang="en-US"/>
           </a:p>
@@ -2560,7 +2566,7 @@
           <a:p>
             <a:fld id="{E1CB8188-18CC-4270-A14A-394BBC8B3A55}" type="datetimeFigureOut">
               <a:rPr lang="en-US" smtClean="0"/>
-              <a:t>3/19/2014</a:t>
+              <a:t>3/21/2014</a:t>
             </a:fld>
             <a:endParaRPr lang="en-US"/>
           </a:p>
@@ -2974,7 +2980,7 @@
         <p:spPr>
           <a:xfrm>
             <a:off x="1276446" y="765868"/>
-            <a:ext cx="10007343" cy="4042855"/>
+            <a:ext cx="10007343" cy="4442035"/>
           </a:xfrm>
           <a:prstGeom prst="rect">
             <a:avLst/>
@@ -3038,7 +3044,7 @@
             <a:pPr algn="ctr"/>
             <a:r>
               <a:rPr lang="en-US" sz="2400" dirty="0" smtClean="0"/>
-              <a:t>Primary Render Loop</a:t>
+              <a:t>Rendering Single – Pipeline</a:t>
             </a:r>
             <a:endParaRPr lang="en-US" sz="2400" dirty="0"/>
           </a:p>
@@ -3046,14 +3052,737 @@
       </p:sp>
       <p:sp>
         <p:nvSpPr>
-          <p:cNvPr id="5" name="Rectangle 4"/>
+          <p:cNvPr id="28" name="Rectangle 27"/>
           <p:cNvSpPr/>
           <p:nvPr/>
         </p:nvSpPr>
         <p:spPr>
           <a:xfrm>
-            <a:off x="900476" y="765867"/>
-            <a:ext cx="283140" cy="5647795"/>
+            <a:off x="7418312" y="1697523"/>
+            <a:ext cx="2361590" cy="211956"/>
+          </a:xfrm>
+          <a:prstGeom prst="rect">
+            <a:avLst/>
+          </a:prstGeom>
+        </p:spPr>
+        <p:style>
+          <a:lnRef idx="2">
+            <a:schemeClr val="accent2">
+              <a:shade val="50000"/>
+            </a:schemeClr>
+          </a:lnRef>
+          <a:fillRef idx="1">
+            <a:schemeClr val="accent2"/>
+          </a:fillRef>
+          <a:effectRef idx="0">
+            <a:schemeClr val="accent2"/>
+          </a:effectRef>
+          <a:fontRef idx="minor">
+            <a:schemeClr val="lt1"/>
+          </a:fontRef>
+        </p:style>
+        <p:txBody>
+          <a:bodyPr rtlCol="0" anchor="ctr"/>
+          <a:lstStyle/>
+          <a:p>
+            <a:pPr algn="ctr"/>
+            <a:r>
+              <a:rPr lang="en-US" sz="1200" dirty="0" smtClean="0"/>
+              <a:t>MRT G-Buffer</a:t>
+            </a:r>
+            <a:endParaRPr lang="en-US" sz="1200" dirty="0"/>
+          </a:p>
+        </p:txBody>
+      </p:sp>
+      <p:sp>
+        <p:nvSpPr>
+          <p:cNvPr id="2" name="Right Arrow 1"/>
+          <p:cNvSpPr/>
+          <p:nvPr/>
+        </p:nvSpPr>
+        <p:spPr>
+          <a:xfrm>
+            <a:off x="2332559" y="1657642"/>
+            <a:ext cx="4940212" cy="306819"/>
+          </a:xfrm>
+          <a:prstGeom prst="rightArrow">
+            <a:avLst>
+              <a:gd name="adj1" fmla="val 68244"/>
+              <a:gd name="adj2" fmla="val 50000"/>
+            </a:avLst>
+          </a:prstGeom>
+        </p:spPr>
+        <p:style>
+          <a:lnRef idx="2">
+            <a:schemeClr val="accent5">
+              <a:shade val="50000"/>
+            </a:schemeClr>
+          </a:lnRef>
+          <a:fillRef idx="1">
+            <a:schemeClr val="accent5"/>
+          </a:fillRef>
+          <a:effectRef idx="0">
+            <a:schemeClr val="accent5"/>
+          </a:effectRef>
+          <a:fontRef idx="minor">
+            <a:schemeClr val="lt1"/>
+          </a:fontRef>
+        </p:style>
+        <p:txBody>
+          <a:bodyPr rtlCol="0" anchor="ctr"/>
+          <a:lstStyle/>
+          <a:p>
+            <a:pPr algn="ctr"/>
+            <a:r>
+              <a:rPr lang="en-US" sz="1200" dirty="0" smtClean="0"/>
+              <a:t>From Camera</a:t>
+            </a:r>
+            <a:endParaRPr lang="en-US" sz="1200" dirty="0"/>
+          </a:p>
+        </p:txBody>
+      </p:sp>
+      <p:sp>
+        <p:nvSpPr>
+          <p:cNvPr id="29" name="Rectangle 28"/>
+          <p:cNvSpPr/>
+          <p:nvPr/>
+        </p:nvSpPr>
+        <p:spPr>
+          <a:xfrm>
+            <a:off x="7420433" y="2058911"/>
+            <a:ext cx="2361590" cy="211956"/>
+          </a:xfrm>
+          <a:prstGeom prst="rect">
+            <a:avLst/>
+          </a:prstGeom>
+        </p:spPr>
+        <p:style>
+          <a:lnRef idx="2">
+            <a:schemeClr val="accent6">
+              <a:shade val="50000"/>
+            </a:schemeClr>
+          </a:lnRef>
+          <a:fillRef idx="1">
+            <a:schemeClr val="accent6"/>
+          </a:fillRef>
+          <a:effectRef idx="0">
+            <a:schemeClr val="accent6"/>
+          </a:effectRef>
+          <a:fontRef idx="minor">
+            <a:schemeClr val="lt1"/>
+          </a:fontRef>
+        </p:style>
+        <p:txBody>
+          <a:bodyPr rtlCol="0" anchor="ctr"/>
+          <a:lstStyle/>
+          <a:p>
+            <a:pPr algn="ctr"/>
+            <a:r>
+              <a:rPr lang="en-US" sz="1200" dirty="0" smtClean="0"/>
+              <a:t>Lighting Depth-Buffer</a:t>
+            </a:r>
+            <a:endParaRPr lang="en-US" sz="1200" dirty="0"/>
+          </a:p>
+        </p:txBody>
+      </p:sp>
+      <p:sp>
+        <p:nvSpPr>
+          <p:cNvPr id="30" name="Right Arrow 29"/>
+          <p:cNvSpPr/>
+          <p:nvPr/>
+        </p:nvSpPr>
+        <p:spPr>
+          <a:xfrm>
+            <a:off x="2336332" y="2022089"/>
+            <a:ext cx="4940212" cy="306819"/>
+          </a:xfrm>
+          <a:prstGeom prst="rightArrow">
+            <a:avLst>
+              <a:gd name="adj1" fmla="val 68244"/>
+              <a:gd name="adj2" fmla="val 50000"/>
+            </a:avLst>
+          </a:prstGeom>
+        </p:spPr>
+        <p:style>
+          <a:lnRef idx="2">
+            <a:schemeClr val="accent5">
+              <a:shade val="50000"/>
+            </a:schemeClr>
+          </a:lnRef>
+          <a:fillRef idx="1">
+            <a:schemeClr val="accent5"/>
+          </a:fillRef>
+          <a:effectRef idx="0">
+            <a:schemeClr val="accent5"/>
+          </a:effectRef>
+          <a:fontRef idx="minor">
+            <a:schemeClr val="lt1"/>
+          </a:fontRef>
+        </p:style>
+        <p:txBody>
+          <a:bodyPr rtlCol="0" anchor="ctr"/>
+          <a:lstStyle/>
+          <a:p>
+            <a:pPr algn="ctr"/>
+            <a:r>
+              <a:rPr lang="en-US" sz="1200" dirty="0" smtClean="0"/>
+              <a:t>From Light </a:t>
+            </a:r>
+            <a:endParaRPr lang="en-US" sz="1200" dirty="0"/>
+          </a:p>
+        </p:txBody>
+      </p:sp>
+      <p:sp>
+        <p:nvSpPr>
+          <p:cNvPr id="31" name="Rectangle 30"/>
+          <p:cNvSpPr/>
+          <p:nvPr/>
+        </p:nvSpPr>
+        <p:spPr>
+          <a:xfrm>
+            <a:off x="7403461" y="1336135"/>
+            <a:ext cx="2361590" cy="211956"/>
+          </a:xfrm>
+          <a:prstGeom prst="rect">
+            <a:avLst/>
+          </a:prstGeom>
+          <a:solidFill>
+            <a:srgbClr val="C00000"/>
+          </a:solidFill>
+        </p:spPr>
+        <p:style>
+          <a:lnRef idx="2">
+            <a:schemeClr val="accent2">
+              <a:shade val="50000"/>
+            </a:schemeClr>
+          </a:lnRef>
+          <a:fillRef idx="1">
+            <a:schemeClr val="accent2"/>
+          </a:fillRef>
+          <a:effectRef idx="0">
+            <a:schemeClr val="accent2"/>
+          </a:effectRef>
+          <a:fontRef idx="minor">
+            <a:schemeClr val="lt1"/>
+          </a:fontRef>
+        </p:style>
+        <p:txBody>
+          <a:bodyPr rtlCol="0" anchor="ctr"/>
+          <a:lstStyle/>
+          <a:p>
+            <a:pPr algn="ctr"/>
+            <a:r>
+              <a:rPr lang="en-US" sz="1200" dirty="0" smtClean="0"/>
+              <a:t>SVO-Buffer</a:t>
+            </a:r>
+            <a:endParaRPr lang="en-US" sz="1200" dirty="0"/>
+          </a:p>
+        </p:txBody>
+      </p:sp>
+      <p:sp>
+        <p:nvSpPr>
+          <p:cNvPr id="32" name="Right Arrow 31"/>
+          <p:cNvSpPr/>
+          <p:nvPr/>
+        </p:nvSpPr>
+        <p:spPr>
+          <a:xfrm>
+            <a:off x="2332559" y="1293195"/>
+            <a:ext cx="4940212" cy="306819"/>
+          </a:xfrm>
+          <a:prstGeom prst="rightArrow">
+            <a:avLst>
+              <a:gd name="adj1" fmla="val 68244"/>
+              <a:gd name="adj2" fmla="val 50000"/>
+            </a:avLst>
+          </a:prstGeom>
+        </p:spPr>
+        <p:style>
+          <a:lnRef idx="2">
+            <a:schemeClr val="accent5">
+              <a:shade val="50000"/>
+            </a:schemeClr>
+          </a:lnRef>
+          <a:fillRef idx="1">
+            <a:schemeClr val="accent5"/>
+          </a:fillRef>
+          <a:effectRef idx="0">
+            <a:schemeClr val="accent5"/>
+          </a:effectRef>
+          <a:fontRef idx="minor">
+            <a:schemeClr val="lt1"/>
+          </a:fontRef>
+        </p:style>
+        <p:txBody>
+          <a:bodyPr rtlCol="0" anchor="ctr"/>
+          <a:lstStyle/>
+          <a:p>
+            <a:pPr algn="ctr"/>
+            <a:r>
+              <a:rPr lang="en-US" sz="1200" dirty="0" smtClean="0"/>
+              <a:t>Voxelize Scene</a:t>
+            </a:r>
+            <a:endParaRPr lang="en-US" sz="1200" dirty="0"/>
+          </a:p>
+        </p:txBody>
+      </p:sp>
+      <p:sp>
+        <p:nvSpPr>
+          <p:cNvPr id="33" name="Right Arrow 32"/>
+          <p:cNvSpPr/>
+          <p:nvPr/>
+        </p:nvSpPr>
+        <p:spPr>
+          <a:xfrm>
+            <a:off x="2317708" y="2449139"/>
+            <a:ext cx="4940212" cy="647450"/>
+          </a:xfrm>
+          <a:prstGeom prst="rightArrow">
+            <a:avLst>
+              <a:gd name="adj1" fmla="val 78577"/>
+              <a:gd name="adj2" fmla="val 20477"/>
+            </a:avLst>
+          </a:prstGeom>
+        </p:spPr>
+        <p:style>
+          <a:lnRef idx="2">
+            <a:schemeClr val="accent5">
+              <a:shade val="50000"/>
+            </a:schemeClr>
+          </a:lnRef>
+          <a:fillRef idx="1">
+            <a:schemeClr val="accent5"/>
+          </a:fillRef>
+          <a:effectRef idx="0">
+            <a:schemeClr val="accent5"/>
+          </a:effectRef>
+          <a:fontRef idx="minor">
+            <a:schemeClr val="lt1"/>
+          </a:fontRef>
+        </p:style>
+        <p:txBody>
+          <a:bodyPr rtlCol="0" anchor="t"/>
+          <a:lstStyle/>
+          <a:p>
+            <a:pPr algn="ctr"/>
+            <a:r>
+              <a:rPr lang="en-US" sz="1200" dirty="0" smtClean="0"/>
+              <a:t>Compose Differed Stages</a:t>
+            </a:r>
+            <a:endParaRPr lang="en-US" sz="1200" dirty="0"/>
+          </a:p>
+        </p:txBody>
+      </p:sp>
+      <p:sp>
+        <p:nvSpPr>
+          <p:cNvPr id="36" name="Rectangle 35"/>
+          <p:cNvSpPr/>
+          <p:nvPr/>
+        </p:nvSpPr>
+        <p:spPr>
+          <a:xfrm>
+            <a:off x="3951217" y="2787401"/>
+            <a:ext cx="1559513" cy="211956"/>
+          </a:xfrm>
+          <a:prstGeom prst="rect">
+            <a:avLst/>
+          </a:prstGeom>
+        </p:spPr>
+        <p:style>
+          <a:lnRef idx="2">
+            <a:schemeClr val="accent2">
+              <a:shade val="50000"/>
+            </a:schemeClr>
+          </a:lnRef>
+          <a:fillRef idx="1">
+            <a:schemeClr val="accent2"/>
+          </a:fillRef>
+          <a:effectRef idx="0">
+            <a:schemeClr val="accent2"/>
+          </a:effectRef>
+          <a:fontRef idx="minor">
+            <a:schemeClr val="lt1"/>
+          </a:fontRef>
+        </p:style>
+        <p:txBody>
+          <a:bodyPr rtlCol="0" anchor="ctr"/>
+          <a:lstStyle/>
+          <a:p>
+            <a:pPr algn="ctr"/>
+            <a:r>
+              <a:rPr lang="en-US" sz="1200" dirty="0" smtClean="0"/>
+              <a:t>Z-Buffer</a:t>
+            </a:r>
+            <a:endParaRPr lang="en-US" sz="1200" dirty="0"/>
+          </a:p>
+        </p:txBody>
+      </p:sp>
+      <p:sp>
+        <p:nvSpPr>
+          <p:cNvPr id="37" name="Rectangle 36"/>
+          <p:cNvSpPr/>
+          <p:nvPr/>
+        </p:nvSpPr>
+        <p:spPr>
+          <a:xfrm>
+            <a:off x="5543223" y="2782143"/>
+            <a:ext cx="1559513" cy="211956"/>
+          </a:xfrm>
+          <a:prstGeom prst="rect">
+            <a:avLst/>
+          </a:prstGeom>
+        </p:spPr>
+        <p:style>
+          <a:lnRef idx="2">
+            <a:schemeClr val="accent6">
+              <a:shade val="50000"/>
+            </a:schemeClr>
+          </a:lnRef>
+          <a:fillRef idx="1">
+            <a:schemeClr val="accent6"/>
+          </a:fillRef>
+          <a:effectRef idx="0">
+            <a:schemeClr val="accent6"/>
+          </a:effectRef>
+          <a:fontRef idx="minor">
+            <a:schemeClr val="lt1"/>
+          </a:fontRef>
+        </p:style>
+        <p:txBody>
+          <a:bodyPr rtlCol="0" anchor="ctr"/>
+          <a:lstStyle/>
+          <a:p>
+            <a:pPr algn="ctr"/>
+            <a:r>
+              <a:rPr lang="en-US" sz="1200" dirty="0" smtClean="0"/>
+              <a:t>Lighting Depth-Buffer</a:t>
+            </a:r>
+            <a:endParaRPr lang="en-US" sz="1200" dirty="0"/>
+          </a:p>
+        </p:txBody>
+      </p:sp>
+      <p:sp>
+        <p:nvSpPr>
+          <p:cNvPr id="38" name="Rectangle 37"/>
+          <p:cNvSpPr/>
+          <p:nvPr/>
+        </p:nvSpPr>
+        <p:spPr>
+          <a:xfrm>
+            <a:off x="2351522" y="2787401"/>
+            <a:ext cx="1559513" cy="211956"/>
+          </a:xfrm>
+          <a:prstGeom prst="rect">
+            <a:avLst/>
+          </a:prstGeom>
+          <a:solidFill>
+            <a:srgbClr val="C00000"/>
+          </a:solidFill>
+        </p:spPr>
+        <p:style>
+          <a:lnRef idx="2">
+            <a:schemeClr val="accent2">
+              <a:shade val="50000"/>
+            </a:schemeClr>
+          </a:lnRef>
+          <a:fillRef idx="1">
+            <a:schemeClr val="accent2"/>
+          </a:fillRef>
+          <a:effectRef idx="0">
+            <a:schemeClr val="accent2"/>
+          </a:effectRef>
+          <a:fontRef idx="minor">
+            <a:schemeClr val="lt1"/>
+          </a:fontRef>
+        </p:style>
+        <p:txBody>
+          <a:bodyPr rtlCol="0" anchor="ctr"/>
+          <a:lstStyle/>
+          <a:p>
+            <a:pPr algn="ctr"/>
+            <a:r>
+              <a:rPr lang="en-US" sz="1200" dirty="0" smtClean="0"/>
+              <a:t>SVO-Buffer</a:t>
+            </a:r>
+            <a:endParaRPr lang="en-US" sz="1200" dirty="0"/>
+          </a:p>
+        </p:txBody>
+      </p:sp>
+      <p:sp>
+        <p:nvSpPr>
+          <p:cNvPr id="39" name="Rectangle 38"/>
+          <p:cNvSpPr/>
+          <p:nvPr/>
+        </p:nvSpPr>
+        <p:spPr>
+          <a:xfrm>
+            <a:off x="7403461" y="2664155"/>
+            <a:ext cx="2361590" cy="211956"/>
+          </a:xfrm>
+          <a:prstGeom prst="rect">
+            <a:avLst/>
+          </a:prstGeom>
+          <a:solidFill>
+            <a:srgbClr val="002060"/>
+          </a:solidFill>
+        </p:spPr>
+        <p:style>
+          <a:lnRef idx="2">
+            <a:schemeClr val="accent2">
+              <a:shade val="50000"/>
+            </a:schemeClr>
+          </a:lnRef>
+          <a:fillRef idx="1">
+            <a:schemeClr val="accent2"/>
+          </a:fillRef>
+          <a:effectRef idx="0">
+            <a:schemeClr val="accent2"/>
+          </a:effectRef>
+          <a:fontRef idx="minor">
+            <a:schemeClr val="lt1"/>
+          </a:fontRef>
+        </p:style>
+        <p:txBody>
+          <a:bodyPr rtlCol="0" anchor="ctr"/>
+          <a:lstStyle/>
+          <a:p>
+            <a:pPr algn="ctr"/>
+            <a:r>
+              <a:rPr lang="en-US" sz="1200" dirty="0" smtClean="0"/>
+              <a:t>Back-Buffer</a:t>
+            </a:r>
+            <a:endParaRPr lang="en-US" sz="1200" dirty="0"/>
+          </a:p>
+        </p:txBody>
+      </p:sp>
+      <p:sp>
+        <p:nvSpPr>
+          <p:cNvPr id="40" name="Right Arrow 39"/>
+          <p:cNvSpPr/>
+          <p:nvPr/>
+        </p:nvSpPr>
+        <p:spPr>
+          <a:xfrm>
+            <a:off x="2317708" y="3273183"/>
+            <a:ext cx="4940212" cy="306819"/>
+          </a:xfrm>
+          <a:prstGeom prst="rightArrow">
+            <a:avLst>
+              <a:gd name="adj1" fmla="val 68244"/>
+              <a:gd name="adj2" fmla="val 50000"/>
+            </a:avLst>
+          </a:prstGeom>
+        </p:spPr>
+        <p:style>
+          <a:lnRef idx="2">
+            <a:schemeClr val="accent5">
+              <a:shade val="50000"/>
+            </a:schemeClr>
+          </a:lnRef>
+          <a:fillRef idx="1">
+            <a:schemeClr val="accent5"/>
+          </a:fillRef>
+          <a:effectRef idx="0">
+            <a:schemeClr val="accent5"/>
+          </a:effectRef>
+          <a:fontRef idx="minor">
+            <a:schemeClr val="lt1"/>
+          </a:fontRef>
+        </p:style>
+        <p:txBody>
+          <a:bodyPr rtlCol="0" anchor="ctr"/>
+          <a:lstStyle/>
+          <a:p>
+            <a:pPr algn="ctr"/>
+            <a:r>
+              <a:rPr lang="en-US" sz="1200" dirty="0" smtClean="0"/>
+              <a:t>Transparency</a:t>
+            </a:r>
+            <a:endParaRPr lang="en-US" sz="1200" dirty="0"/>
+          </a:p>
+        </p:txBody>
+      </p:sp>
+      <p:sp>
+        <p:nvSpPr>
+          <p:cNvPr id="41" name="Rectangle 40"/>
+          <p:cNvSpPr/>
+          <p:nvPr/>
+        </p:nvSpPr>
+        <p:spPr>
+          <a:xfrm>
+            <a:off x="7403461" y="3318365"/>
+            <a:ext cx="2361590" cy="211956"/>
+          </a:xfrm>
+          <a:prstGeom prst="rect">
+            <a:avLst/>
+          </a:prstGeom>
+          <a:solidFill>
+            <a:srgbClr val="002060"/>
+          </a:solidFill>
+        </p:spPr>
+        <p:style>
+          <a:lnRef idx="2">
+            <a:schemeClr val="accent2">
+              <a:shade val="50000"/>
+            </a:schemeClr>
+          </a:lnRef>
+          <a:fillRef idx="1">
+            <a:schemeClr val="accent2"/>
+          </a:fillRef>
+          <a:effectRef idx="0">
+            <a:schemeClr val="accent2"/>
+          </a:effectRef>
+          <a:fontRef idx="minor">
+            <a:schemeClr val="lt1"/>
+          </a:fontRef>
+        </p:style>
+        <p:txBody>
+          <a:bodyPr rtlCol="0" anchor="ctr"/>
+          <a:lstStyle/>
+          <a:p>
+            <a:pPr algn="ctr"/>
+            <a:r>
+              <a:rPr lang="en-US" sz="1200" dirty="0" smtClean="0"/>
+              <a:t>Back-Buffer</a:t>
+            </a:r>
+            <a:endParaRPr lang="en-US" sz="1200" dirty="0"/>
+          </a:p>
+        </p:txBody>
+      </p:sp>
+      <p:sp>
+        <p:nvSpPr>
+          <p:cNvPr id="42" name="Right Arrow 41"/>
+          <p:cNvSpPr/>
+          <p:nvPr/>
+        </p:nvSpPr>
+        <p:spPr>
+          <a:xfrm>
+            <a:off x="2317708" y="3641667"/>
+            <a:ext cx="4940212" cy="306819"/>
+          </a:xfrm>
+          <a:prstGeom prst="rightArrow">
+            <a:avLst>
+              <a:gd name="adj1" fmla="val 68244"/>
+              <a:gd name="adj2" fmla="val 50000"/>
+            </a:avLst>
+          </a:prstGeom>
+        </p:spPr>
+        <p:style>
+          <a:lnRef idx="2">
+            <a:schemeClr val="accent5">
+              <a:shade val="50000"/>
+            </a:schemeClr>
+          </a:lnRef>
+          <a:fillRef idx="1">
+            <a:schemeClr val="accent5"/>
+          </a:fillRef>
+          <a:effectRef idx="0">
+            <a:schemeClr val="accent5"/>
+          </a:effectRef>
+          <a:fontRef idx="minor">
+            <a:schemeClr val="lt1"/>
+          </a:fontRef>
+        </p:style>
+        <p:txBody>
+          <a:bodyPr rtlCol="0" anchor="ctr"/>
+          <a:lstStyle/>
+          <a:p>
+            <a:pPr algn="ctr"/>
+            <a:r>
+              <a:rPr lang="en-US" sz="1200" dirty="0" smtClean="0"/>
+              <a:t>GUI</a:t>
+            </a:r>
+            <a:endParaRPr lang="en-US" sz="1200" dirty="0"/>
+          </a:p>
+        </p:txBody>
+      </p:sp>
+      <p:sp>
+        <p:nvSpPr>
+          <p:cNvPr id="43" name="Rectangle 42"/>
+          <p:cNvSpPr/>
+          <p:nvPr/>
+        </p:nvSpPr>
+        <p:spPr>
+          <a:xfrm>
+            <a:off x="7403461" y="3686849"/>
+            <a:ext cx="2361590" cy="211956"/>
+          </a:xfrm>
+          <a:prstGeom prst="rect">
+            <a:avLst/>
+          </a:prstGeom>
+          <a:solidFill>
+            <a:srgbClr val="002060"/>
+          </a:solidFill>
+        </p:spPr>
+        <p:style>
+          <a:lnRef idx="2">
+            <a:schemeClr val="accent2">
+              <a:shade val="50000"/>
+            </a:schemeClr>
+          </a:lnRef>
+          <a:fillRef idx="1">
+            <a:schemeClr val="accent2"/>
+          </a:fillRef>
+          <a:effectRef idx="0">
+            <a:schemeClr val="accent2"/>
+          </a:effectRef>
+          <a:fontRef idx="minor">
+            <a:schemeClr val="lt1"/>
+          </a:fontRef>
+        </p:style>
+        <p:txBody>
+          <a:bodyPr rtlCol="0" anchor="ctr"/>
+          <a:lstStyle/>
+          <a:p>
+            <a:pPr algn="ctr"/>
+            <a:r>
+              <a:rPr lang="en-US" sz="1200" dirty="0" smtClean="0"/>
+              <a:t>Back-Buffer</a:t>
+            </a:r>
+            <a:endParaRPr lang="en-US" sz="1200" dirty="0"/>
+          </a:p>
+        </p:txBody>
+      </p:sp>
+    </p:spTree>
+    <p:extLst>
+      <p:ext uri="{BB962C8B-B14F-4D97-AF65-F5344CB8AC3E}">
+        <p14:creationId xmlns:p14="http://schemas.microsoft.com/office/powerpoint/2010/main" val="3454020874"/>
+      </p:ext>
+    </p:extLst>
+  </p:cSld>
+  <p:clrMapOvr>
+    <a:masterClrMapping/>
+  </p:clrMapOvr>
+</p:sld>
+</file>
+
+<file path=ppt/slides/slide2.xml><?xml version="1.0" encoding="utf-8"?>
+<p:sld xmlns:a="http://schemas.openxmlformats.org/drawingml/2006/main" xmlns:r="http://schemas.openxmlformats.org/officeDocument/2006/relationships" xmlns:p="http://schemas.openxmlformats.org/presentationml/2006/main">
+  <p:cSld>
+    <p:spTree>
+      <p:nvGrpSpPr>
+        <p:cNvPr id="1" name=""/>
+        <p:cNvGrpSpPr/>
+        <p:nvPr/>
+      </p:nvGrpSpPr>
+      <p:grpSpPr>
+        <a:xfrm>
+          <a:off x="0" y="0"/>
+          <a:ext cx="0" cy="0"/>
+          <a:chOff x="0" y="0"/>
+          <a:chExt cx="0" cy="0"/>
+        </a:xfrm>
+      </p:grpSpPr>
+      <p:sp>
+        <p:nvSpPr>
+          <p:cNvPr id="15" name="Rectangle 14"/>
+          <p:cNvSpPr/>
+          <p:nvPr/>
+        </p:nvSpPr>
+        <p:spPr>
+          <a:xfrm>
+            <a:off x="1276446" y="765868"/>
+            <a:ext cx="10007343" cy="4042855"/>
           </a:xfrm>
           <a:prstGeom prst="rect">
             <a:avLst/>
@@ -3076,6 +3805,85 @@
           </a:fontRef>
         </p:style>
         <p:txBody>
+          <a:bodyPr rtlCol="0" anchor="t"/>
+          <a:lstStyle/>
+          <a:p>
+            <a:pPr algn="ctr"/>
+            <a:r>
+              <a:rPr lang="en-US" sz="1200" u="sng" dirty="0" smtClean="0"/>
+              <a:t>Differed Pipe</a:t>
+            </a:r>
+            <a:endParaRPr lang="en-US" sz="1200" u="sng" dirty="0"/>
+          </a:p>
+        </p:txBody>
+      </p:sp>
+      <p:sp>
+        <p:nvSpPr>
+          <p:cNvPr id="4" name="TextBox 3"/>
+          <p:cNvSpPr txBox="1"/>
+          <p:nvPr/>
+        </p:nvSpPr>
+        <p:spPr>
+          <a:xfrm>
+            <a:off x="0" y="0"/>
+            <a:ext cx="12192000" cy="615553"/>
+          </a:xfrm>
+          <a:prstGeom prst="rect">
+            <a:avLst/>
+          </a:prstGeom>
+          <a:noFill/>
+        </p:spPr>
+        <p:txBody>
+          <a:bodyPr wrap="square" rtlCol="0" anchor="t">
+            <a:spAutoFit/>
+          </a:bodyPr>
+          <a:lstStyle/>
+          <a:p>
+            <a:pPr algn="ctr"/>
+            <a:endParaRPr lang="en-US" sz="1000" dirty="0" smtClean="0"/>
+          </a:p>
+          <a:p>
+            <a:pPr algn="ctr"/>
+            <a:r>
+              <a:rPr lang="en-US" sz="2400" dirty="0" smtClean="0"/>
+              <a:t>Primary Render Loop</a:t>
+            </a:r>
+            <a:endParaRPr lang="en-US" sz="2400" dirty="0"/>
+          </a:p>
+        </p:txBody>
+      </p:sp>
+      <p:sp>
+        <p:nvSpPr>
+          <p:cNvPr id="5" name="Rectangle 4"/>
+          <p:cNvSpPr/>
+          <p:nvPr/>
+        </p:nvSpPr>
+        <p:spPr>
+          <a:xfrm>
+            <a:off x="900476" y="765867"/>
+            <a:ext cx="283140" cy="5647795"/>
+          </a:xfrm>
+          <a:prstGeom prst="rect">
+            <a:avLst/>
+          </a:prstGeom>
+        </p:spPr>
+        <p:style>
+          <a:lnRef idx="2">
+            <a:schemeClr val="accent3">
+              <a:shade val="50000"/>
+            </a:schemeClr>
+          </a:lnRef>
+          <a:fillRef idx="1">
+            <a:schemeClr val="accent3"/>
+          </a:fillRef>
+          <a:effectRef idx="0">
+            <a:schemeClr val="accent3"/>
+          </a:effectRef>
+          <a:fontRef idx="minor">
+            <a:schemeClr val="lt1"/>
+          </a:fontRef>
+        </p:style>
+        <p:txBody>
           <a:bodyPr vert="vert270" rtlCol="0" anchor="ctr"/>
           <a:lstStyle/>
           <a:p>
@@ -3175,11 +3983,7 @@
             <a:pPr algn="ctr"/>
             <a:r>
               <a:rPr lang="en-US" sz="1200" dirty="0" smtClean="0"/>
-              <a:t>Render bounding volumes with Occlusion Query ( Single Shader, Back-Buffered, </a:t>
-            </a:r>
-            <a:r>
-              <a:rPr lang="en-US" sz="1200" dirty="0" smtClean="0"/>
-              <a:t>Back To Front )</a:t>
+              <a:t>Render bounding volumes with Occlusion Query ( Single Shader, Back-Buffered, Back To Front )</a:t>
             </a:r>
             <a:endParaRPr lang="en-US" sz="1200" dirty="0"/>
           </a:p>
@@ -3923,7 +4727,7 @@
 </p:sld>
 </file>
 
-<file path=ppt/slides/slide2.xml><?xml version="1.0" encoding="utf-8"?>
+<file path=ppt/slides/slide3.xml><?xml version="1.0" encoding="utf-8"?>
 <p:sld xmlns:a="http://schemas.openxmlformats.org/drawingml/2006/main" xmlns:r="http://schemas.openxmlformats.org/officeDocument/2006/relationships" xmlns:p="http://schemas.openxmlformats.org/presentationml/2006/main">
   <p:cSld>
     <p:spTree>

</xml_diff>